<commit_message>
Added one PISP interaction
</commit_message>
<xml_diff>
--- a/payments/openbanking-security-actors-interaction.pptx
+++ b/payments/openbanking-security-actors-interaction.pptx
@@ -288,7 +288,7 @@
           <a:p>
             <a:fld id="{ACA14FDE-46FF-4805-9154-CB827A54529B}" type="datetimeFigureOut">
               <a:rPr lang="en-US" smtClean="0"/>
-              <a:t>2020-04-04</a:t>
+              <a:t>2020-04-05</a:t>
             </a:fld>
             <a:endParaRPr lang="en-US"/>
           </a:p>
@@ -458,7 +458,7 @@
           <a:p>
             <a:fld id="{ACA14FDE-46FF-4805-9154-CB827A54529B}" type="datetimeFigureOut">
               <a:rPr lang="en-US" smtClean="0"/>
-              <a:t>2020-04-04</a:t>
+              <a:t>2020-04-05</a:t>
             </a:fld>
             <a:endParaRPr lang="en-US"/>
           </a:p>
@@ -638,7 +638,7 @@
           <a:p>
             <a:fld id="{ACA14FDE-46FF-4805-9154-CB827A54529B}" type="datetimeFigureOut">
               <a:rPr lang="en-US" smtClean="0"/>
-              <a:t>2020-04-04</a:t>
+              <a:t>2020-04-05</a:t>
             </a:fld>
             <a:endParaRPr lang="en-US"/>
           </a:p>
@@ -808,7 +808,7 @@
           <a:p>
             <a:fld id="{ACA14FDE-46FF-4805-9154-CB827A54529B}" type="datetimeFigureOut">
               <a:rPr lang="en-US" smtClean="0"/>
-              <a:t>2020-04-04</a:t>
+              <a:t>2020-04-05</a:t>
             </a:fld>
             <a:endParaRPr lang="en-US"/>
           </a:p>
@@ -1054,7 +1054,7 @@
           <a:p>
             <a:fld id="{ACA14FDE-46FF-4805-9154-CB827A54529B}" type="datetimeFigureOut">
               <a:rPr lang="en-US" smtClean="0"/>
-              <a:t>2020-04-04</a:t>
+              <a:t>2020-04-05</a:t>
             </a:fld>
             <a:endParaRPr lang="en-US"/>
           </a:p>
@@ -1342,7 +1342,7 @@
           <a:p>
             <a:fld id="{ACA14FDE-46FF-4805-9154-CB827A54529B}" type="datetimeFigureOut">
               <a:rPr lang="en-US" smtClean="0"/>
-              <a:t>2020-04-04</a:t>
+              <a:t>2020-04-05</a:t>
             </a:fld>
             <a:endParaRPr lang="en-US"/>
           </a:p>
@@ -1764,7 +1764,7 @@
           <a:p>
             <a:fld id="{ACA14FDE-46FF-4805-9154-CB827A54529B}" type="datetimeFigureOut">
               <a:rPr lang="en-US" smtClean="0"/>
-              <a:t>2020-04-04</a:t>
+              <a:t>2020-04-05</a:t>
             </a:fld>
             <a:endParaRPr lang="en-US"/>
           </a:p>
@@ -1882,7 +1882,7 @@
           <a:p>
             <a:fld id="{ACA14FDE-46FF-4805-9154-CB827A54529B}" type="datetimeFigureOut">
               <a:rPr lang="en-US" smtClean="0"/>
-              <a:t>2020-04-04</a:t>
+              <a:t>2020-04-05</a:t>
             </a:fld>
             <a:endParaRPr lang="en-US"/>
           </a:p>
@@ -1977,7 +1977,7 @@
           <a:p>
             <a:fld id="{ACA14FDE-46FF-4805-9154-CB827A54529B}" type="datetimeFigureOut">
               <a:rPr lang="en-US" smtClean="0"/>
-              <a:t>2020-04-04</a:t>
+              <a:t>2020-04-05</a:t>
             </a:fld>
             <a:endParaRPr lang="en-US"/>
           </a:p>
@@ -2254,7 +2254,7 @@
           <a:p>
             <a:fld id="{ACA14FDE-46FF-4805-9154-CB827A54529B}" type="datetimeFigureOut">
               <a:rPr lang="en-US" smtClean="0"/>
-              <a:t>2020-04-04</a:t>
+              <a:t>2020-04-05</a:t>
             </a:fld>
             <a:endParaRPr lang="en-US"/>
           </a:p>
@@ -2507,7 +2507,7 @@
           <a:p>
             <a:fld id="{ACA14FDE-46FF-4805-9154-CB827A54529B}" type="datetimeFigureOut">
               <a:rPr lang="en-US" smtClean="0"/>
-              <a:t>2020-04-04</a:t>
+              <a:t>2020-04-05</a:t>
             </a:fld>
             <a:endParaRPr lang="en-US"/>
           </a:p>
@@ -2720,7 +2720,7 @@
           <a:p>
             <a:fld id="{ACA14FDE-46FF-4805-9154-CB827A54529B}" type="datetimeFigureOut">
               <a:rPr lang="en-US" smtClean="0"/>
-              <a:t>2020-04-04</a:t>
+              <a:t>2020-04-05</a:t>
             </a:fld>
             <a:endParaRPr lang="en-US"/>
           </a:p>
@@ -11163,7 +11163,11 @@
           <a:p>
             <a:r>
               <a:rPr lang="en-US" sz="1000" dirty="0" smtClean="0"/>
-              <a:t>2020-04-04 anders.rundgren.net@gmail.com</a:t>
+              <a:t>2020-04-05 </a:t>
+            </a:r>
+            <a:r>
+              <a:rPr lang="en-US" sz="1000" dirty="0" smtClean="0"/>
+              <a:t>anders.rundgren.net@gmail.com</a:t>
             </a:r>
             <a:endParaRPr lang="en-US" sz="1000" dirty="0"/>
           </a:p>
@@ -11259,6 +11263,43 @@
           </a:p>
         </p:txBody>
       </p:sp>
+      <p:cxnSp>
+        <p:nvCxnSpPr>
+          <p:cNvPr id="210" name="Straight Arrow Connector 209"/>
+          <p:cNvCxnSpPr/>
+          <p:nvPr/>
+        </p:nvCxnSpPr>
+        <p:spPr>
+          <a:xfrm>
+            <a:off x="4620768" y="3742944"/>
+            <a:ext cx="1406176" cy="550450"/>
+          </a:xfrm>
+          <a:prstGeom prst="straightConnector1">
+            <a:avLst/>
+          </a:prstGeom>
+          <a:ln w="19050">
+            <a:solidFill>
+              <a:schemeClr val="accent1"/>
+            </a:solidFill>
+            <a:headEnd type="triangle" w="med" len="sm"/>
+            <a:tailEnd type="triangle" w="med" len="sm"/>
+          </a:ln>
+        </p:spPr>
+        <p:style>
+          <a:lnRef idx="1">
+            <a:schemeClr val="accent1"/>
+          </a:lnRef>
+          <a:fillRef idx="0">
+            <a:schemeClr val="accent1"/>
+          </a:fillRef>
+          <a:effectRef idx="0">
+            <a:schemeClr val="accent1"/>
+          </a:effectRef>
+          <a:fontRef idx="minor">
+            <a:schemeClr val="tx1"/>
+          </a:fontRef>
+        </p:style>
+      </p:cxnSp>
     </p:spTree>
     <p:extLst>
       <p:ext uri="{BB962C8B-B14F-4D97-AF65-F5344CB8AC3E}">

</xml_diff>